<commit_message>
Byte 2 assignment details.
</commit_message>
<xml_diff>
--- a/Lectures/Byte 2.pptx
+++ b/Lectures/Byte 2.pptx
@@ -3056,7 +3056,7 @@
           <a:p>
             <a:fld id="{D3AAB66F-B1B7-D045-B4E8-4F60236F228D}" type="datetimeFigureOut">
               <a:rPr lang="en-US" smtClean="0"/>
-              <a:t>1/20/15</a:t>
+              <a:t>1/21/16</a:t>
             </a:fld>
             <a:endParaRPr lang="en-US"/>
           </a:p>
@@ -3222,7 +3222,7 @@
           <a:p>
             <a:fld id="{BCCF8E76-06A6-164E-A6FA-EC32C13EB232}" type="datetimeFigureOut">
               <a:rPr lang="en-US" smtClean="0"/>
-              <a:t>1/20/15</a:t>
+              <a:t>1/21/16</a:t>
             </a:fld>
             <a:endParaRPr lang="en-US"/>
           </a:p>
@@ -4008,7 +4008,7 @@
             <a:fld id="{FA3C144B-2939-9A49-B014-915EC3E81866}" type="datetime1">
               <a:rPr lang="en-US" smtClean="0"/>
               <a:pPr/>
-              <a:t>1/20/15</a:t>
+              <a:t>1/21/16</a:t>
             </a:fld>
             <a:endParaRPr lang="en-US" dirty="0"/>
           </a:p>
@@ -4437,7 +4437,7 @@
           <a:p>
             <a:fld id="{76838339-A875-5E45-AB3F-AAABD270346A}" type="datetime1">
               <a:rPr lang="en-US" smtClean="0"/>
-              <a:t>1/20/15</a:t>
+              <a:t>1/21/16</a:t>
             </a:fld>
             <a:endParaRPr lang="en-US"/>
           </a:p>
@@ -4723,7 +4723,7 @@
             <a:fld id="{FA3C144B-2939-9A49-B014-915EC3E81866}" type="datetime1">
               <a:rPr lang="en-US" smtClean="0"/>
               <a:pPr/>
-              <a:t>1/20/15</a:t>
+              <a:t>1/21/16</a:t>
             </a:fld>
             <a:endParaRPr lang="en-US" dirty="0"/>
           </a:p>
@@ -5205,7 +5205,7 @@
           <a:p>
             <a:fld id="{A73F672F-A5FB-5745-934A-1BF51CA5539C}" type="datetime1">
               <a:rPr lang="en-US" smtClean="0"/>
-              <a:t>1/20/15</a:t>
+              <a:t>1/21/16</a:t>
             </a:fld>
             <a:endParaRPr lang="en-US"/>
           </a:p>
@@ -5547,7 +5547,7 @@
             <a:fld id="{FA3C144B-2939-9A49-B014-915EC3E81866}" type="datetime1">
               <a:rPr lang="en-US" smtClean="0"/>
               <a:pPr/>
-              <a:t>1/20/15</a:t>
+              <a:t>1/21/16</a:t>
             </a:fld>
             <a:endParaRPr lang="en-US" dirty="0"/>
           </a:p>
@@ -6011,7 +6011,7 @@
           <a:p>
             <a:fld id="{6AFE6A63-5EBE-3E48-B0AE-DF655A1ECE76}" type="datetime1">
               <a:rPr lang="en-US" smtClean="0"/>
-              <a:t>1/20/15</a:t>
+              <a:t>1/21/16</a:t>
             </a:fld>
             <a:endParaRPr lang="en-US"/>
           </a:p>
@@ -6330,7 +6330,7 @@
           <a:p>
             <a:fld id="{4A019F0C-9D18-B54A-9AC9-18AA74EDB034}" type="datetime1">
               <a:rPr lang="en-US" smtClean="0"/>
-              <a:t>1/20/15</a:t>
+              <a:t>1/21/16</a:t>
             </a:fld>
             <a:endParaRPr lang="en-US"/>
           </a:p>
@@ -6640,7 +6640,7 @@
             <a:fld id="{FA3C144B-2939-9A49-B014-915EC3E81866}" type="datetime1">
               <a:rPr lang="en-US" smtClean="0"/>
               <a:pPr/>
-              <a:t>1/20/15</a:t>
+              <a:t>1/21/16</a:t>
             </a:fld>
             <a:endParaRPr lang="en-US" dirty="0"/>
           </a:p>
@@ -6903,7 +6903,7 @@
           <a:p>
             <a:fld id="{FA3C144B-2939-9A49-B014-915EC3E81866}" type="datetime1">
               <a:rPr lang="en-US" smtClean="0"/>
-              <a:t>1/20/15</a:t>
+              <a:t>1/21/16</a:t>
             </a:fld>
             <a:endParaRPr lang="en-US" dirty="0"/>
           </a:p>
@@ -7271,7 +7271,7 @@
           <a:p>
             <a:fld id="{7053BEFA-1175-F644-B249-7D41D72BD3FF}" type="datetime1">
               <a:rPr lang="en-US" smtClean="0"/>
-              <a:t>1/20/15</a:t>
+              <a:t>1/21/16</a:t>
             </a:fld>
             <a:endParaRPr lang="en-US"/>
           </a:p>
@@ -7390,7 +7390,7 @@
             <a:fld id="{FA3C144B-2939-9A49-B014-915EC3E81866}" type="datetime1">
               <a:rPr lang="en-US" smtClean="0"/>
               <a:pPr/>
-              <a:t>1/20/15</a:t>
+              <a:t>1/21/16</a:t>
             </a:fld>
             <a:endParaRPr lang="en-US" dirty="0"/>
           </a:p>
@@ -7607,7 +7607,7 @@
             <a:fld id="{FA3C144B-2939-9A49-B014-915EC3E81866}" type="datetime1">
               <a:rPr lang="en-US" smtClean="0"/>
               <a:pPr/>
-              <a:t>1/20/15</a:t>
+              <a:t>1/21/16</a:t>
             </a:fld>
             <a:endParaRPr lang="en-US" dirty="0"/>
           </a:p>
@@ -7852,7 +7852,7 @@
             <a:fld id="{FA3C144B-2939-9A49-B014-915EC3E81866}" type="datetime1">
               <a:rPr lang="en-US" smtClean="0"/>
               <a:pPr/>
-              <a:t>1/20/15</a:t>
+              <a:t>1/21/16</a:t>
             </a:fld>
             <a:endParaRPr lang="en-US" dirty="0"/>
           </a:p>
@@ -8230,7 +8230,7 @@
           <a:p>
             <a:fld id="{111EEF3B-ABF2-AA4E-9E24-0C6256942674}" type="datetime1">
               <a:rPr lang="en-US" smtClean="0"/>
-              <a:t>1/20/15</a:t>
+              <a:t>1/21/16</a:t>
             </a:fld>
             <a:endParaRPr lang="en-US"/>
           </a:p>
@@ -8394,7 +8394,7 @@
             <a:fld id="{FA3C144B-2939-9A49-B014-915EC3E81866}" type="datetime1">
               <a:rPr lang="en-US" smtClean="0"/>
               <a:pPr/>
-              <a:t>1/20/15</a:t>
+              <a:t>1/21/16</a:t>
             </a:fld>
             <a:endParaRPr lang="en-US" dirty="0"/>
           </a:p>
@@ -8811,7 +8811,7 @@
             <a:fld id="{FA3C144B-2939-9A49-B014-915EC3E81866}" type="datetime1">
               <a:rPr lang="en-US" smtClean="0"/>
               <a:pPr/>
-              <a:t>1/20/15</a:t>
+              <a:t>1/21/16</a:t>
             </a:fld>
             <a:endParaRPr lang="en-US" dirty="0"/>
           </a:p>
@@ -9127,7 +9127,7 @@
             <a:fld id="{FA3C144B-2939-9A49-B014-915EC3E81866}" type="datetime1">
               <a:rPr lang="en-US" smtClean="0"/>
               <a:pPr/>
-              <a:t>1/20/15</a:t>
+              <a:t>1/21/16</a:t>
             </a:fld>
             <a:endParaRPr lang="en-US" dirty="0"/>
           </a:p>
@@ -9793,7 +9793,7 @@
             <a:fld id="{FA3C144B-2939-9A49-B014-915EC3E81866}" type="datetime1">
               <a:rPr lang="en-US" smtClean="0"/>
               <a:pPr/>
-              <a:t>1/20/15</a:t>
+              <a:t>1/21/16</a:t>
             </a:fld>
             <a:endParaRPr lang="en-US" dirty="0"/>
           </a:p>
@@ -10969,7 +10969,7 @@
           <a:p>
             <a:fld id="{7053BEFA-1175-F644-B249-7D41D72BD3FF}" type="datetime1">
               <a:rPr lang="en-US" smtClean="0"/>
-              <a:t>1/20/15</a:t>
+              <a:t>1/21/16</a:t>
             </a:fld>
             <a:endParaRPr lang="en-US"/>
           </a:p>
@@ -11155,7 +11155,7 @@
           <a:p>
             <a:fld id="{7053BEFA-1175-F644-B249-7D41D72BD3FF}" type="datetime1">
               <a:rPr lang="en-US" smtClean="0"/>
-              <a:t>1/20/15</a:t>
+              <a:t>1/21/16</a:t>
             </a:fld>
             <a:endParaRPr lang="en-US"/>
           </a:p>
@@ -11345,7 +11345,7 @@
           <a:p>
             <a:fld id="{7053BEFA-1175-F644-B249-7D41D72BD3FF}" type="datetime1">
               <a:rPr lang="en-US" smtClean="0"/>
-              <a:t>1/20/15</a:t>
+              <a:t>1/21/16</a:t>
             </a:fld>
             <a:endParaRPr lang="en-US"/>
           </a:p>
@@ -11590,7 +11590,7 @@
           <a:p>
             <a:fld id="{7053BEFA-1175-F644-B249-7D41D72BD3FF}" type="datetime1">
               <a:rPr lang="en-US" smtClean="0"/>
-              <a:t>1/20/15</a:t>
+              <a:t>1/21/16</a:t>
             </a:fld>
             <a:endParaRPr lang="en-US"/>
           </a:p>
@@ -11835,7 +11835,7 @@
           <a:p>
             <a:fld id="{7053BEFA-1175-F644-B249-7D41D72BD3FF}" type="datetime1">
               <a:rPr lang="en-US" smtClean="0"/>
-              <a:t>1/20/15</a:t>
+              <a:t>1/21/16</a:t>
             </a:fld>
             <a:endParaRPr lang="en-US"/>
           </a:p>
@@ -12080,7 +12080,7 @@
           <a:p>
             <a:fld id="{7053BEFA-1175-F644-B249-7D41D72BD3FF}" type="datetime1">
               <a:rPr lang="en-US" smtClean="0"/>
-              <a:t>1/20/15</a:t>
+              <a:t>1/21/16</a:t>
             </a:fld>
             <a:endParaRPr lang="en-US"/>
           </a:p>
@@ -12274,7 +12274,7 @@
           <a:p>
             <a:fld id="{7053BEFA-1175-F644-B249-7D41D72BD3FF}" type="datetime1">
               <a:rPr lang="en-US" smtClean="0"/>
-              <a:t>1/20/15</a:t>
+              <a:t>1/21/16</a:t>
             </a:fld>
             <a:endParaRPr lang="en-US"/>
           </a:p>
@@ -12568,7 +12568,7 @@
           <a:p>
             <a:fld id="{7053BEFA-1175-F644-B249-7D41D72BD3FF}" type="datetime1">
               <a:rPr lang="en-US" smtClean="0"/>
-              <a:t>1/20/15</a:t>
+              <a:t>1/21/16</a:t>
             </a:fld>
             <a:endParaRPr lang="en-US"/>
           </a:p>
@@ -12811,7 +12811,7 @@
           <a:p>
             <a:fld id="{7053BEFA-1175-F644-B249-7D41D72BD3FF}" type="datetime1">
               <a:rPr lang="en-US" smtClean="0"/>
-              <a:t>1/20/15</a:t>
+              <a:t>1/21/16</a:t>
             </a:fld>
             <a:endParaRPr lang="en-US"/>
           </a:p>
@@ -13110,7 +13110,7 @@
           <a:p>
             <a:fld id="{7053BEFA-1175-F644-B249-7D41D72BD3FF}" type="datetime1">
               <a:rPr lang="en-US" smtClean="0"/>
-              <a:t>1/20/15</a:t>
+              <a:t>1/21/16</a:t>
             </a:fld>
             <a:endParaRPr lang="en-US"/>
           </a:p>
@@ -13242,9 +13242,14 @@
               <a:buNone/>
             </a:pPr>
             <a:r>
-              <a:rPr lang="en-US" dirty="0" smtClean="0"/>
-              <a:t>jmankoff-byte2.appspot.com</a:t>
-            </a:r>
+              <a:rPr lang="en-US" dirty="0" err="1" smtClean="0"/>
+              <a:t>jmankoff</a:t>
+            </a:r>
+            <a:r>
+              <a:rPr lang="en-US" dirty="0" err="1" smtClean="0"/>
+              <a:t>-explore.appspot.com</a:t>
+            </a:r>
+            <a:endParaRPr lang="en-US" dirty="0" smtClean="0"/>
           </a:p>
           <a:p>
             <a:pPr marL="0" indent="0">
@@ -13331,7 +13336,7 @@
           <a:p>
             <a:fld id="{7053BEFA-1175-F644-B249-7D41D72BD3FF}" type="datetime1">
               <a:rPr lang="en-US" smtClean="0"/>
-              <a:t>1/20/15</a:t>
+              <a:t>1/21/16</a:t>
             </a:fld>
             <a:endParaRPr lang="en-US"/>
           </a:p>
@@ -13600,7 +13605,7 @@
           <a:p>
             <a:fld id="{7053BEFA-1175-F644-B249-7D41D72BD3FF}" type="datetime1">
               <a:rPr lang="en-US" smtClean="0"/>
-              <a:t>1/20/15</a:t>
+              <a:t>1/21/16</a:t>
             </a:fld>
             <a:endParaRPr lang="en-US"/>
           </a:p>
@@ -13920,7 +13925,7 @@
           <a:p>
             <a:fld id="{7053BEFA-1175-F644-B249-7D41D72BD3FF}" type="datetime1">
               <a:rPr lang="en-US" smtClean="0"/>
-              <a:t>1/20/15</a:t>
+              <a:t>1/21/16</a:t>
             </a:fld>
             <a:endParaRPr lang="en-US"/>
           </a:p>
@@ -14207,7 +14212,7 @@
           <a:p>
             <a:fld id="{7053BEFA-1175-F644-B249-7D41D72BD3FF}" type="datetime1">
               <a:rPr lang="en-US" smtClean="0"/>
-              <a:t>1/20/15</a:t>
+              <a:t>1/21/16</a:t>
             </a:fld>
             <a:endParaRPr lang="en-US"/>
           </a:p>
@@ -14417,7 +14422,7 @@
           <a:p>
             <a:fld id="{7053BEFA-1175-F644-B249-7D41D72BD3FF}" type="datetime1">
               <a:rPr lang="en-US" smtClean="0"/>
-              <a:t>1/20/15</a:t>
+              <a:t>1/21/16</a:t>
             </a:fld>
             <a:endParaRPr lang="en-US"/>
           </a:p>
@@ -14664,7 +14669,7 @@
           <a:p>
             <a:fld id="{7053BEFA-1175-F644-B249-7D41D72BD3FF}" type="datetime1">
               <a:rPr lang="en-US" smtClean="0"/>
-              <a:t>1/20/15</a:t>
+              <a:t>1/21/16</a:t>
             </a:fld>
             <a:endParaRPr lang="en-US"/>
           </a:p>
@@ -14922,7 +14927,7 @@
           <a:p>
             <a:fld id="{7053BEFA-1175-F644-B249-7D41D72BD3FF}" type="datetime1">
               <a:rPr lang="en-US" smtClean="0"/>
-              <a:t>1/20/15</a:t>
+              <a:t>1/21/16</a:t>
             </a:fld>
             <a:endParaRPr lang="en-US"/>
           </a:p>
@@ -15169,7 +15174,7 @@
           <a:p>
             <a:fld id="{7053BEFA-1175-F644-B249-7D41D72BD3FF}" type="datetime1">
               <a:rPr lang="en-US" smtClean="0"/>
-              <a:t>1/20/15</a:t>
+              <a:t>1/21/16</a:t>
             </a:fld>
             <a:endParaRPr lang="en-US"/>
           </a:p>
@@ -15476,7 +15481,7 @@
           <a:p>
             <a:fld id="{7053BEFA-1175-F644-B249-7D41D72BD3FF}" type="datetime1">
               <a:rPr lang="en-US" smtClean="0"/>
-              <a:t>1/20/15</a:t>
+              <a:t>1/21/16</a:t>
             </a:fld>
             <a:endParaRPr lang="en-US"/>
           </a:p>
@@ -15624,7 +15629,12 @@
             <p:ph idx="1"/>
           </p:nvPr>
         </p:nvSpPr>
-        <p:spPr/>
+        <p:spPr>
+          <a:xfrm>
+            <a:off x="1128943" y="1707993"/>
+            <a:ext cx="7048804" cy="4379976"/>
+          </a:xfrm>
+        </p:spPr>
         <p:txBody>
           <a:bodyPr/>
           <a:lstStyle/>
@@ -15705,6 +15715,23 @@
             </a:r>
             <a:endParaRPr lang="en-US" sz="1800" dirty="0"/>
           </a:p>
+          <a:p>
+            <a:pPr marL="0" indent="0">
+              <a:buNone/>
+            </a:pPr>
+            <a:r>
+              <a:rPr lang="en-US" sz="2400" dirty="0" smtClean="0"/>
+              <a:t>Answers could include text, hand drawn images, </a:t>
+            </a:r>
+            <a:r>
+              <a:rPr lang="en-US" sz="2400" dirty="0" err="1" smtClean="0"/>
+              <a:t>pyplot</a:t>
+            </a:r>
+            <a:r>
+              <a:rPr lang="en-US" sz="2400" dirty="0" smtClean="0"/>
+              <a:t> images, even interactive graphics</a:t>
+            </a:r>
+          </a:p>
         </p:txBody>
       </p:sp>
       <p:sp>
@@ -15724,7 +15751,7 @@
           <a:p>
             <a:fld id="{7053BEFA-1175-F644-B249-7D41D72BD3FF}" type="datetime1">
               <a:rPr lang="en-US" smtClean="0"/>
-              <a:t>1/20/15</a:t>
+              <a:t>1/21/16</a:t>
             </a:fld>
             <a:endParaRPr lang="en-US"/>
           </a:p>
@@ -15909,7 +15936,7 @@
           <a:p>
             <a:fld id="{7053BEFA-1175-F644-B249-7D41D72BD3FF}" type="datetime1">
               <a:rPr lang="en-US" smtClean="0"/>
-              <a:t>1/20/15</a:t>
+              <a:t>1/21/16</a:t>
             </a:fld>
             <a:endParaRPr lang="en-US"/>
           </a:p>
@@ -16143,7 +16170,7 @@
           <a:p>
             <a:fld id="{7053BEFA-1175-F644-B249-7D41D72BD3FF}" type="datetime1">
               <a:rPr lang="en-US" smtClean="0"/>
-              <a:t>1/20/15</a:t>
+              <a:t>1/21/16</a:t>
             </a:fld>
             <a:endParaRPr lang="en-US"/>
           </a:p>
@@ -16300,7 +16327,7 @@
           <a:p>
             <a:fld id="{7053BEFA-1175-F644-B249-7D41D72BD3FF}" type="datetime1">
               <a:rPr lang="en-US" smtClean="0"/>
-              <a:t>1/20/15</a:t>
+              <a:t>1/21/16</a:t>
             </a:fld>
             <a:endParaRPr lang="en-US"/>
           </a:p>
@@ -16472,7 +16499,7 @@
           <a:p>
             <a:fld id="{7053BEFA-1175-F644-B249-7D41D72BD3FF}" type="datetime1">
               <a:rPr lang="en-US" smtClean="0"/>
-              <a:t>1/20/15</a:t>
+              <a:t>1/21/16</a:t>
             </a:fld>
             <a:endParaRPr lang="en-US"/>
           </a:p>
@@ -16691,7 +16718,7 @@
           <a:p>
             <a:fld id="{7053BEFA-1175-F644-B249-7D41D72BD3FF}" type="datetime1">
               <a:rPr lang="en-US" smtClean="0"/>
-              <a:t>1/20/15</a:t>
+              <a:t>1/21/16</a:t>
             </a:fld>
             <a:endParaRPr lang="en-US"/>
           </a:p>
@@ -17035,7 +17062,7 @@
           <a:p>
             <a:fld id="{7053BEFA-1175-F644-B249-7D41D72BD3FF}" type="datetime1">
               <a:rPr lang="en-US" smtClean="0"/>
-              <a:t>1/20/15</a:t>
+              <a:t>1/21/16</a:t>
             </a:fld>
             <a:endParaRPr lang="en-US"/>
           </a:p>
@@ -17327,7 +17354,7 @@
           <a:p>
             <a:fld id="{7053BEFA-1175-F644-B249-7D41D72BD3FF}" type="datetime1">
               <a:rPr lang="en-US" smtClean="0"/>
-              <a:t>1/20/15</a:t>
+              <a:t>1/21/16</a:t>
             </a:fld>
             <a:endParaRPr lang="en-US"/>
           </a:p>
@@ -17955,7 +17982,7 @@
           <a:p>
             <a:fld id="{7053BEFA-1175-F644-B249-7D41D72BD3FF}" type="datetime1">
               <a:rPr lang="en-US" smtClean="0"/>
-              <a:t>1/20/15</a:t>
+              <a:t>1/21/16</a:t>
             </a:fld>
             <a:endParaRPr lang="en-US"/>
           </a:p>
@@ -18122,7 +18149,7 @@
           <a:p>
             <a:fld id="{7053BEFA-1175-F644-B249-7D41D72BD3FF}" type="datetime1">
               <a:rPr lang="en-US" smtClean="0"/>
-              <a:t>1/20/15</a:t>
+              <a:t>1/21/16</a:t>
             </a:fld>
             <a:endParaRPr lang="en-US"/>
           </a:p>

</xml_diff>